<commit_message>
Terminando slide de decorators
</commit_message>
<xml_diff>
--- a/slides/decorators/Deep Dive Python.pptx
+++ b/slides/decorators/Deep Dive Python.pptx
@@ -14,10 +14,12 @@
     <p:sldId id="265" r:id="rId8"/>
     <p:sldId id="263" r:id="rId9"/>
     <p:sldId id="264" r:id="rId10"/>
-    <p:sldId id="269" r:id="rId11"/>
-    <p:sldId id="267" r:id="rId12"/>
-    <p:sldId id="266" r:id="rId13"/>
-    <p:sldId id="268" r:id="rId14"/>
+    <p:sldId id="270" r:id="rId11"/>
+    <p:sldId id="269" r:id="rId12"/>
+    <p:sldId id="271" r:id="rId13"/>
+    <p:sldId id="267" r:id="rId14"/>
+    <p:sldId id="266" r:id="rId15"/>
+    <p:sldId id="268" r:id="rId16"/>
   </p:sldIdLst>
   <p:sldSz cx="12192000" cy="6858000"/>
   <p:notesSz cx="6858000" cy="9144000"/>
@@ -321,7 +323,7 @@
           <a:p>
             <a:fld id="{FFD7E874-8197-4932-8FCB-4FFBD39C8C6E}" type="datetimeFigureOut">
               <a:rPr lang="en-ZA" smtClean="0"/>
-              <a:t>2025/01/15</a:t>
+              <a:t>2025/01/17</a:t>
             </a:fld>
             <a:endParaRPr lang="en-ZA"/>
           </a:p>
@@ -619,7 +621,7 @@
           <a:p>
             <a:fld id="{FFD7E874-8197-4932-8FCB-4FFBD39C8C6E}" type="datetimeFigureOut">
               <a:rPr lang="en-ZA" smtClean="0"/>
-              <a:t>2025/01/15</a:t>
+              <a:t>2025/01/17</a:t>
             </a:fld>
             <a:endParaRPr lang="en-ZA"/>
           </a:p>
@@ -811,7 +813,7 @@
           <a:p>
             <a:fld id="{FFD7E874-8197-4932-8FCB-4FFBD39C8C6E}" type="datetimeFigureOut">
               <a:rPr lang="en-ZA" smtClean="0"/>
-              <a:t>2025/01/15</a:t>
+              <a:t>2025/01/17</a:t>
             </a:fld>
             <a:endParaRPr lang="en-ZA"/>
           </a:p>
@@ -1072,7 +1074,7 @@
           <a:p>
             <a:fld id="{FFD7E874-8197-4932-8FCB-4FFBD39C8C6E}" type="datetimeFigureOut">
               <a:rPr lang="en-ZA" smtClean="0"/>
-              <a:t>2025/01/15</a:t>
+              <a:t>2025/01/17</a:t>
             </a:fld>
             <a:endParaRPr lang="en-ZA"/>
           </a:p>
@@ -1496,7 +1498,7 @@
           <a:p>
             <a:fld id="{FFD7E874-8197-4932-8FCB-4FFBD39C8C6E}" type="datetimeFigureOut">
               <a:rPr lang="en-ZA" smtClean="0"/>
-              <a:t>2025/01/15</a:t>
+              <a:t>2025/01/17</a:t>
             </a:fld>
             <a:endParaRPr lang="en-ZA"/>
           </a:p>
@@ -2033,7 +2035,7 @@
           <a:p>
             <a:fld id="{FFD7E874-8197-4932-8FCB-4FFBD39C8C6E}" type="datetimeFigureOut">
               <a:rPr lang="en-ZA" smtClean="0"/>
-              <a:t>2025/01/15</a:t>
+              <a:t>2025/01/17</a:t>
             </a:fld>
             <a:endParaRPr lang="en-ZA"/>
           </a:p>
@@ -2897,7 +2899,7 @@
           <a:p>
             <a:fld id="{FFD7E874-8197-4932-8FCB-4FFBD39C8C6E}" type="datetimeFigureOut">
               <a:rPr lang="en-ZA" smtClean="0"/>
-              <a:t>2025/01/15</a:t>
+              <a:t>2025/01/17</a:t>
             </a:fld>
             <a:endParaRPr lang="en-ZA"/>
           </a:p>
@@ -3067,7 +3069,7 @@
           <a:p>
             <a:fld id="{FFD7E874-8197-4932-8FCB-4FFBD39C8C6E}" type="datetimeFigureOut">
               <a:rPr lang="en-ZA" smtClean="0"/>
-              <a:t>2025/01/15</a:t>
+              <a:t>2025/01/17</a:t>
             </a:fld>
             <a:endParaRPr lang="en-ZA"/>
           </a:p>
@@ -3251,7 +3253,7 @@
           <a:p>
             <a:fld id="{FFD7E874-8197-4932-8FCB-4FFBD39C8C6E}" type="datetimeFigureOut">
               <a:rPr lang="en-ZA" smtClean="0"/>
-              <a:t>2025/01/15</a:t>
+              <a:t>2025/01/17</a:t>
             </a:fld>
             <a:endParaRPr lang="en-ZA"/>
           </a:p>
@@ -3421,7 +3423,7 @@
           <a:p>
             <a:fld id="{FFD7E874-8197-4932-8FCB-4FFBD39C8C6E}" type="datetimeFigureOut">
               <a:rPr lang="en-ZA" smtClean="0"/>
-              <a:t>2025/01/15</a:t>
+              <a:t>2025/01/17</a:t>
             </a:fld>
             <a:endParaRPr lang="en-ZA"/>
           </a:p>
@@ -3665,7 +3667,7 @@
           <a:p>
             <a:fld id="{FFD7E874-8197-4932-8FCB-4FFBD39C8C6E}" type="datetimeFigureOut">
               <a:rPr lang="en-ZA" smtClean="0"/>
-              <a:t>2025/01/15</a:t>
+              <a:t>2025/01/17</a:t>
             </a:fld>
             <a:endParaRPr lang="en-ZA"/>
           </a:p>
@@ -3901,7 +3903,7 @@
           <a:p>
             <a:fld id="{FFD7E874-8197-4932-8FCB-4FFBD39C8C6E}" type="datetimeFigureOut">
               <a:rPr lang="en-ZA" smtClean="0"/>
-              <a:t>2025/01/15</a:t>
+              <a:t>2025/01/17</a:t>
             </a:fld>
             <a:endParaRPr lang="en-ZA"/>
           </a:p>
@@ -4367,7 +4369,7 @@
           <a:p>
             <a:fld id="{FFD7E874-8197-4932-8FCB-4FFBD39C8C6E}" type="datetimeFigureOut">
               <a:rPr lang="en-ZA" smtClean="0"/>
-              <a:t>2025/01/15</a:t>
+              <a:t>2025/01/17</a:t>
             </a:fld>
             <a:endParaRPr lang="en-ZA"/>
           </a:p>
@@ -4485,7 +4487,7 @@
           <a:p>
             <a:fld id="{FFD7E874-8197-4932-8FCB-4FFBD39C8C6E}" type="datetimeFigureOut">
               <a:rPr lang="en-ZA" smtClean="0"/>
-              <a:t>2025/01/15</a:t>
+              <a:t>2025/01/17</a:t>
             </a:fld>
             <a:endParaRPr lang="en-ZA"/>
           </a:p>
@@ -4580,7 +4582,7 @@
           <a:p>
             <a:fld id="{FFD7E874-8197-4932-8FCB-4FFBD39C8C6E}" type="datetimeFigureOut">
               <a:rPr lang="en-ZA" smtClean="0"/>
-              <a:t>2025/01/15</a:t>
+              <a:t>2025/01/17</a:t>
             </a:fld>
             <a:endParaRPr lang="en-ZA"/>
           </a:p>
@@ -4835,7 +4837,7 @@
           <a:p>
             <a:fld id="{FFD7E874-8197-4932-8FCB-4FFBD39C8C6E}" type="datetimeFigureOut">
               <a:rPr lang="en-ZA" smtClean="0"/>
-              <a:t>2025/01/15</a:t>
+              <a:t>2025/01/17</a:t>
             </a:fld>
             <a:endParaRPr lang="en-ZA"/>
           </a:p>
@@ -5135,7 +5137,7 @@
           <a:p>
             <a:fld id="{FFD7E874-8197-4932-8FCB-4FFBD39C8C6E}" type="datetimeFigureOut">
               <a:rPr lang="en-ZA" smtClean="0"/>
-              <a:t>2025/01/15</a:t>
+              <a:t>2025/01/17</a:t>
             </a:fld>
             <a:endParaRPr lang="en-ZA"/>
           </a:p>
@@ -5369,7 +5371,7 @@
           <a:p>
             <a:fld id="{FFD7E874-8197-4932-8FCB-4FFBD39C8C6E}" type="datetimeFigureOut">
               <a:rPr lang="en-ZA" smtClean="0"/>
-              <a:t>2025/01/15</a:t>
+              <a:t>2025/01/17</a:t>
             </a:fld>
             <a:endParaRPr lang="en-ZA"/>
           </a:p>
@@ -5480,7 +5482,7 @@
           <p:nvPr userDrawn="1">
             <p:extLst>
               <p:ext uri="{1162E1C5-73C7-4A58-AE30-91384D911F3F}">
-                <p184:classification xmlns:p184="http://schemas.microsoft.com/office/powerpoint/2018/4/main" xmlns="" val="ftr"/>
+                <p184:classification xmlns:p184="http://schemas.microsoft.com/office/powerpoint/2018/4/main" val="ftr"/>
               </p:ext>
             </p:extLst>
           </p:nvPr>
@@ -6276,6 +6278,434 @@
       </p:grpSpPr>
       <p:sp>
         <p:nvSpPr>
+          <p:cNvPr id="16" name="Rectangle 15">
+            <a:extLst>
+              <a:ext uri="{FF2B5EF4-FFF2-40B4-BE49-F238E27FC236}">
+                <a16:creationId xmlns:a16="http://schemas.microsoft.com/office/drawing/2014/main" id="{E59A3988-8555-FC71-0EEB-173729510835}"/>
+              </a:ext>
+            </a:extLst>
+          </p:cNvPr>
+          <p:cNvSpPr/>
+          <p:nvPr/>
+        </p:nvSpPr>
+        <p:spPr>
+          <a:xfrm>
+            <a:off x="3240349" y="2332043"/>
+            <a:ext cx="1509204" cy="1118587"/>
+          </a:xfrm>
+          <a:prstGeom prst="rect">
+            <a:avLst/>
+          </a:prstGeom>
+          <a:noFill/>
+          <a:ln w="9525" cap="flat" cmpd="sng" algn="ctr">
+            <a:solidFill>
+              <a:schemeClr val="accent2"/>
+            </a:solidFill>
+            <a:prstDash val="solid"/>
+            <a:round/>
+            <a:headEnd type="none" w="med" len="med"/>
+            <a:tailEnd type="none" w="med" len="med"/>
+          </a:ln>
+        </p:spPr>
+        <p:style>
+          <a:lnRef idx="0">
+            <a:scrgbClr r="0" g="0" b="0"/>
+          </a:lnRef>
+          <a:fillRef idx="0">
+            <a:scrgbClr r="0" g="0" b="0"/>
+          </a:fillRef>
+          <a:effectRef idx="0">
+            <a:scrgbClr r="0" g="0" b="0"/>
+          </a:effectRef>
+          <a:fontRef idx="minor">
+            <a:schemeClr val="accent2"/>
+          </a:fontRef>
+        </p:style>
+        <p:txBody>
+          <a:bodyPr rtlCol="0" anchor="ctr"/>
+          <a:lstStyle/>
+          <a:p>
+            <a:pPr algn="ctr"/>
+            <a:r>
+              <a:rPr lang="en-US" dirty="0"/>
+              <a:t>LOCAL - L</a:t>
+            </a:r>
+            <a:endParaRPr lang="en-ZA" dirty="0"/>
+          </a:p>
+        </p:txBody>
+      </p:sp>
+      <p:sp>
+        <p:nvSpPr>
+          <p:cNvPr id="17" name="Rectangle 16">
+            <a:extLst>
+              <a:ext uri="{FF2B5EF4-FFF2-40B4-BE49-F238E27FC236}">
+                <a16:creationId xmlns:a16="http://schemas.microsoft.com/office/drawing/2014/main" id="{E35B5D08-CD7B-D3AB-C68F-B722784FDD91}"/>
+              </a:ext>
+            </a:extLst>
+          </p:cNvPr>
+          <p:cNvSpPr/>
+          <p:nvPr/>
+        </p:nvSpPr>
+        <p:spPr>
+          <a:xfrm>
+            <a:off x="3240348" y="2332043"/>
+            <a:ext cx="2799429" cy="1695635"/>
+          </a:xfrm>
+          <a:prstGeom prst="rect">
+            <a:avLst/>
+          </a:prstGeom>
+          <a:noFill/>
+          <a:ln w="9525" cap="flat" cmpd="sng" algn="ctr">
+            <a:solidFill>
+              <a:schemeClr val="accent2"/>
+            </a:solidFill>
+            <a:prstDash val="solid"/>
+            <a:round/>
+            <a:headEnd type="none" w="med" len="med"/>
+            <a:tailEnd type="none" w="med" len="med"/>
+          </a:ln>
+        </p:spPr>
+        <p:style>
+          <a:lnRef idx="0">
+            <a:scrgbClr r="0" g="0" b="0"/>
+          </a:lnRef>
+          <a:fillRef idx="0">
+            <a:scrgbClr r="0" g="0" b="0"/>
+          </a:fillRef>
+          <a:effectRef idx="0">
+            <a:scrgbClr r="0" g="0" b="0"/>
+          </a:effectRef>
+          <a:fontRef idx="minor">
+            <a:schemeClr val="accent2"/>
+          </a:fontRef>
+        </p:style>
+        <p:txBody>
+          <a:bodyPr rtlCol="0" anchor="ctr"/>
+          <a:lstStyle/>
+          <a:p>
+            <a:pPr algn="ctr"/>
+            <a:r>
+              <a:rPr lang="en-US" dirty="0"/>
+              <a:t>						</a:t>
+            </a:r>
+          </a:p>
+          <a:p>
+            <a:pPr algn="ctr"/>
+            <a:endParaRPr lang="en-US" dirty="0"/>
+          </a:p>
+          <a:p>
+            <a:pPr algn="ctr"/>
+            <a:endParaRPr lang="en-US" dirty="0"/>
+          </a:p>
+          <a:p>
+            <a:pPr algn="ctr"/>
+            <a:r>
+              <a:rPr lang="en-US" dirty="0"/>
+              <a:t>ENCLOSING - E</a:t>
+            </a:r>
+            <a:endParaRPr lang="en-ZA" dirty="0"/>
+          </a:p>
+        </p:txBody>
+      </p:sp>
+      <p:sp>
+        <p:nvSpPr>
+          <p:cNvPr id="18" name="Rectangle 17">
+            <a:extLst>
+              <a:ext uri="{FF2B5EF4-FFF2-40B4-BE49-F238E27FC236}">
+                <a16:creationId xmlns:a16="http://schemas.microsoft.com/office/drawing/2014/main" id="{992152E1-A7A0-7DFC-0E6D-82EC5184EBB1}"/>
+              </a:ext>
+            </a:extLst>
+          </p:cNvPr>
+          <p:cNvSpPr/>
+          <p:nvPr/>
+        </p:nvSpPr>
+        <p:spPr>
+          <a:xfrm>
+            <a:off x="3240348" y="2332043"/>
+            <a:ext cx="3808523" cy="2342226"/>
+          </a:xfrm>
+          <a:prstGeom prst="rect">
+            <a:avLst/>
+          </a:prstGeom>
+          <a:noFill/>
+          <a:ln w="9525" cap="flat" cmpd="sng" algn="ctr">
+            <a:solidFill>
+              <a:schemeClr val="accent2"/>
+            </a:solidFill>
+            <a:prstDash val="solid"/>
+            <a:round/>
+            <a:headEnd type="none" w="med" len="med"/>
+            <a:tailEnd type="none" w="med" len="med"/>
+          </a:ln>
+        </p:spPr>
+        <p:style>
+          <a:lnRef idx="0">
+            <a:scrgbClr r="0" g="0" b="0"/>
+          </a:lnRef>
+          <a:fillRef idx="0">
+            <a:scrgbClr r="0" g="0" b="0"/>
+          </a:fillRef>
+          <a:effectRef idx="0">
+            <a:scrgbClr r="0" g="0" b="0"/>
+          </a:effectRef>
+          <a:fontRef idx="minor">
+            <a:schemeClr val="accent2"/>
+          </a:fontRef>
+        </p:style>
+        <p:txBody>
+          <a:bodyPr rtlCol="0" anchor="ctr"/>
+          <a:lstStyle/>
+          <a:p>
+            <a:pPr algn="ctr"/>
+            <a:r>
+              <a:rPr lang="en-US" dirty="0"/>
+              <a:t>						</a:t>
+            </a:r>
+          </a:p>
+          <a:p>
+            <a:pPr algn="ctr"/>
+            <a:endParaRPr lang="en-US" dirty="0"/>
+          </a:p>
+          <a:p>
+            <a:pPr algn="ctr"/>
+            <a:endParaRPr lang="en-US" dirty="0"/>
+          </a:p>
+          <a:p>
+            <a:pPr algn="ctr"/>
+            <a:endParaRPr lang="en-US" dirty="0"/>
+          </a:p>
+          <a:p>
+            <a:pPr algn="ctr"/>
+            <a:endParaRPr lang="en-US" dirty="0"/>
+          </a:p>
+          <a:p>
+            <a:pPr algn="ctr"/>
+            <a:endParaRPr lang="en-US" dirty="0"/>
+          </a:p>
+          <a:p>
+            <a:pPr algn="ctr"/>
+            <a:endParaRPr lang="en-US" dirty="0"/>
+          </a:p>
+          <a:p>
+            <a:pPr algn="ctr"/>
+            <a:r>
+              <a:rPr lang="en-US" dirty="0"/>
+              <a:t>GLOBAL - G</a:t>
+            </a:r>
+            <a:endParaRPr lang="en-ZA" dirty="0"/>
+          </a:p>
+        </p:txBody>
+      </p:sp>
+      <p:sp>
+        <p:nvSpPr>
+          <p:cNvPr id="19" name="Rectangle 18">
+            <a:extLst>
+              <a:ext uri="{FF2B5EF4-FFF2-40B4-BE49-F238E27FC236}">
+                <a16:creationId xmlns:a16="http://schemas.microsoft.com/office/drawing/2014/main" id="{1DB0B4CB-6B8A-287A-3650-F62860AA63E5}"/>
+              </a:ext>
+            </a:extLst>
+          </p:cNvPr>
+          <p:cNvSpPr/>
+          <p:nvPr/>
+        </p:nvSpPr>
+        <p:spPr>
+          <a:xfrm>
+            <a:off x="3240347" y="2332043"/>
+            <a:ext cx="4925628" cy="2858610"/>
+          </a:xfrm>
+          <a:prstGeom prst="rect">
+            <a:avLst/>
+          </a:prstGeom>
+          <a:noFill/>
+          <a:ln w="9525" cap="flat" cmpd="sng" algn="ctr">
+            <a:solidFill>
+              <a:schemeClr val="accent2"/>
+            </a:solidFill>
+            <a:prstDash val="solid"/>
+            <a:round/>
+            <a:headEnd type="none" w="med" len="med"/>
+            <a:tailEnd type="none" w="med" len="med"/>
+          </a:ln>
+        </p:spPr>
+        <p:style>
+          <a:lnRef idx="0">
+            <a:scrgbClr r="0" g="0" b="0"/>
+          </a:lnRef>
+          <a:fillRef idx="0">
+            <a:scrgbClr r="0" g="0" b="0"/>
+          </a:fillRef>
+          <a:effectRef idx="0">
+            <a:scrgbClr r="0" g="0" b="0"/>
+          </a:effectRef>
+          <a:fontRef idx="minor">
+            <a:schemeClr val="accent2"/>
+          </a:fontRef>
+        </p:style>
+        <p:txBody>
+          <a:bodyPr rtlCol="0" anchor="ctr"/>
+          <a:lstStyle/>
+          <a:p>
+            <a:pPr algn="ctr"/>
+            <a:r>
+              <a:rPr lang="en-US" dirty="0"/>
+              <a:t>						</a:t>
+            </a:r>
+          </a:p>
+          <a:p>
+            <a:pPr algn="ctr"/>
+            <a:endParaRPr lang="en-US" dirty="0"/>
+          </a:p>
+          <a:p>
+            <a:pPr algn="ctr"/>
+            <a:endParaRPr lang="en-US" dirty="0"/>
+          </a:p>
+          <a:p>
+            <a:pPr algn="ctr"/>
+            <a:endParaRPr lang="en-US" dirty="0"/>
+          </a:p>
+          <a:p>
+            <a:pPr algn="ctr"/>
+            <a:endParaRPr lang="en-US" dirty="0"/>
+          </a:p>
+          <a:p>
+            <a:pPr algn="ctr"/>
+            <a:endParaRPr lang="en-US" dirty="0"/>
+          </a:p>
+          <a:p>
+            <a:pPr algn="ctr"/>
+            <a:endParaRPr lang="en-US" dirty="0"/>
+          </a:p>
+          <a:p>
+            <a:pPr algn="ctr"/>
+            <a:endParaRPr lang="en-US" dirty="0"/>
+          </a:p>
+          <a:p>
+            <a:pPr algn="ctr"/>
+            <a:endParaRPr lang="en-US" dirty="0"/>
+          </a:p>
+          <a:p>
+            <a:pPr algn="ctr"/>
+            <a:r>
+              <a:rPr lang="en-US" dirty="0"/>
+              <a:t>BUILT-IN - B</a:t>
+            </a:r>
+            <a:endParaRPr lang="en-ZA" dirty="0"/>
+          </a:p>
+        </p:txBody>
+      </p:sp>
+      <p:sp>
+        <p:nvSpPr>
+          <p:cNvPr id="24" name="Title 1">
+            <a:extLst>
+              <a:ext uri="{FF2B5EF4-FFF2-40B4-BE49-F238E27FC236}">
+                <a16:creationId xmlns:a16="http://schemas.microsoft.com/office/drawing/2014/main" id="{B4425089-AED7-4259-9B80-5A71C2C82E81}"/>
+              </a:ext>
+            </a:extLst>
+          </p:cNvPr>
+          <p:cNvSpPr>
+            <a:spLocks noGrp="1"/>
+          </p:cNvSpPr>
+          <p:nvPr>
+            <p:ph type="title"/>
+          </p:nvPr>
+        </p:nvSpPr>
+        <p:spPr>
+          <a:xfrm>
+            <a:off x="913795" y="609600"/>
+            <a:ext cx="10353762" cy="970450"/>
+          </a:xfrm>
+        </p:spPr>
+        <p:txBody>
+          <a:bodyPr>
+            <a:normAutofit/>
+          </a:bodyPr>
+          <a:lstStyle/>
+          <a:p>
+            <a:r>
+              <a:rPr lang="en-US" kern="100" dirty="0">
+                <a:solidFill>
+                  <a:schemeClr val="accent2">
+                    <a:lumMod val="75000"/>
+                  </a:schemeClr>
+                </a:solidFill>
+                <a:effectLst/>
+                <a:ea typeface="Calibri" panose="020F0502020204030204" pitchFamily="34" charset="0"/>
+                <a:cs typeface="Times New Roman" panose="02020603050405020304" pitchFamily="18" charset="0"/>
+              </a:rPr>
+              <a:t>LEGB</a:t>
+            </a:r>
+            <a:endParaRPr lang="en-US" dirty="0"/>
+          </a:p>
+        </p:txBody>
+      </p:sp>
+      <p:pic>
+        <p:nvPicPr>
+          <p:cNvPr id="25" name="Picture 24" descr="A white and black logo&#10;&#10;Description automatically generated">
+            <a:extLst>
+              <a:ext uri="{FF2B5EF4-FFF2-40B4-BE49-F238E27FC236}">
+                <a16:creationId xmlns:a16="http://schemas.microsoft.com/office/drawing/2014/main" id="{5F9B9FB0-93EF-DE4B-73A8-B387E08C157E}"/>
+              </a:ext>
+            </a:extLst>
+          </p:cNvPr>
+          <p:cNvPicPr>
+            <a:picLocks noChangeAspect="1"/>
+          </p:cNvPicPr>
+          <p:nvPr/>
+        </p:nvPicPr>
+        <p:blipFill>
+          <a:blip r:embed="rId2">
+            <a:extLst>
+              <a:ext uri="{28A0092B-C50C-407E-A947-70E740481C1C}">
+                <a14:useLocalDpi xmlns:a14="http://schemas.microsoft.com/office/drawing/2010/main" val="0"/>
+              </a:ext>
+            </a:extLst>
+          </a:blip>
+          <a:stretch>
+            <a:fillRect/>
+          </a:stretch>
+        </p:blipFill>
+        <p:spPr>
+          <a:xfrm>
+            <a:off x="144506" y="676831"/>
+            <a:ext cx="779937" cy="779937"/>
+          </a:xfrm>
+          <a:prstGeom prst="rect">
+            <a:avLst/>
+          </a:prstGeom>
+        </p:spPr>
+      </p:pic>
+    </p:spTree>
+    <p:extLst>
+      <p:ext uri="{BB962C8B-B14F-4D97-AF65-F5344CB8AC3E}">
+        <p14:creationId xmlns:p14="http://schemas.microsoft.com/office/powerpoint/2010/main" val="493926879"/>
+      </p:ext>
+    </p:extLst>
+  </p:cSld>
+  <p:clrMapOvr>
+    <a:masterClrMapping/>
+  </p:clrMapOvr>
+</p:sld>
+</file>
+
+<file path=ppt/slides/slide11.xml><?xml version="1.0" encoding="utf-8"?>
+<p:sld xmlns:a="http://schemas.openxmlformats.org/drawingml/2006/main" xmlns:r="http://schemas.openxmlformats.org/officeDocument/2006/relationships" xmlns:p="http://schemas.openxmlformats.org/presentationml/2006/main">
+  <p:cSld>
+    <p:spTree>
+      <p:nvGrpSpPr>
+        <p:cNvPr id="1" name=""/>
+        <p:cNvGrpSpPr/>
+        <p:nvPr/>
+      </p:nvGrpSpPr>
+      <p:grpSpPr>
+        <a:xfrm>
+          <a:off x="0" y="0"/>
+          <a:ext cx="0" cy="0"/>
+          <a:chOff x="0" y="0"/>
+          <a:chExt cx="0" cy="0"/>
+        </a:xfrm>
+      </p:grpSpPr>
+      <p:sp>
+        <p:nvSpPr>
           <p:cNvPr id="4" name="Title 1">
             <a:extLst>
               <a:ext uri="{FF2B5EF4-FFF2-40B4-BE49-F238E27FC236}">
@@ -6417,7 +6847,121 @@
 </p:sld>
 </file>
 
-<file path=ppt/slides/slide11.xml><?xml version="1.0" encoding="utf-8"?>
+<file path=ppt/slides/slide12.xml><?xml version="1.0" encoding="utf-8"?>
+<p:sld xmlns:a="http://schemas.openxmlformats.org/drawingml/2006/main" xmlns:r="http://schemas.openxmlformats.org/officeDocument/2006/relationships" xmlns:p="http://schemas.openxmlformats.org/presentationml/2006/main">
+  <p:cSld>
+    <p:spTree>
+      <p:nvGrpSpPr>
+        <p:cNvPr id="1" name=""/>
+        <p:cNvGrpSpPr/>
+        <p:nvPr/>
+      </p:nvGrpSpPr>
+      <p:grpSpPr>
+        <a:xfrm>
+          <a:off x="0" y="0"/>
+          <a:ext cx="0" cy="0"/>
+          <a:chOff x="0" y="0"/>
+          <a:chExt cx="0" cy="0"/>
+        </a:xfrm>
+      </p:grpSpPr>
+      <p:sp>
+        <p:nvSpPr>
+          <p:cNvPr id="3" name="Content Placeholder 2">
+            <a:extLst>
+              <a:ext uri="{FF2B5EF4-FFF2-40B4-BE49-F238E27FC236}">
+                <a16:creationId xmlns:a16="http://schemas.microsoft.com/office/drawing/2014/main" id="{56249399-AF4F-4B7C-8D76-D17D5D723E66}"/>
+              </a:ext>
+            </a:extLst>
+          </p:cNvPr>
+          <p:cNvSpPr>
+            <a:spLocks noGrp="1"/>
+          </p:cNvSpPr>
+          <p:nvPr>
+            <p:ph idx="1"/>
+          </p:nvPr>
+        </p:nvSpPr>
+        <p:spPr>
+          <a:xfrm>
+            <a:off x="1187520" y="1956566"/>
+            <a:ext cx="10296268" cy="3207103"/>
+          </a:xfrm>
+        </p:spPr>
+        <p:txBody>
+          <a:bodyPr>
+            <a:normAutofit/>
+          </a:bodyPr>
+          <a:lstStyle/>
+          <a:p>
+            <a:pPr marL="36900" indent="0">
+              <a:buNone/>
+            </a:pPr>
+            <a:r>
+              <a:rPr lang="en-GB" sz="14000" kern="100" dirty="0">
+                <a:solidFill>
+                  <a:schemeClr val="accent2">
+                    <a:lumMod val="75000"/>
+                  </a:schemeClr>
+                </a:solidFill>
+                <a:effectLst/>
+                <a:ea typeface="Calibri" panose="020F0502020204030204" pitchFamily="34" charset="0"/>
+                <a:cs typeface="Times New Roman" panose="02020603050405020304" pitchFamily="18" charset="0"/>
+              </a:rPr>
+              <a:t>Closures</a:t>
+            </a:r>
+            <a:endParaRPr lang="en-US" sz="14000" dirty="0"/>
+          </a:p>
+        </p:txBody>
+      </p:sp>
+      <p:pic>
+        <p:nvPicPr>
+          <p:cNvPr id="4" name="Picture 3" descr="A white and black logo&#10;&#10;Description automatically generated">
+            <a:extLst>
+              <a:ext uri="{FF2B5EF4-FFF2-40B4-BE49-F238E27FC236}">
+                <a16:creationId xmlns:a16="http://schemas.microsoft.com/office/drawing/2014/main" id="{015BCAC0-4B3B-427B-A322-347C49C38C8A}"/>
+              </a:ext>
+            </a:extLst>
+          </p:cNvPr>
+          <p:cNvPicPr>
+            <a:picLocks noChangeAspect="1"/>
+          </p:cNvPicPr>
+          <p:nvPr/>
+        </p:nvPicPr>
+        <p:blipFill>
+          <a:blip r:embed="rId2">
+            <a:extLst>
+              <a:ext uri="{28A0092B-C50C-407E-A947-70E740481C1C}">
+                <a14:useLocalDpi xmlns:a14="http://schemas.microsoft.com/office/drawing/2010/main" val="0"/>
+              </a:ext>
+            </a:extLst>
+          </a:blip>
+          <a:stretch>
+            <a:fillRect/>
+          </a:stretch>
+        </p:blipFill>
+        <p:spPr>
+          <a:xfrm>
+            <a:off x="133858" y="314888"/>
+            <a:ext cx="779937" cy="779937"/>
+          </a:xfrm>
+          <a:prstGeom prst="rect">
+            <a:avLst/>
+          </a:prstGeom>
+        </p:spPr>
+      </p:pic>
+    </p:spTree>
+    <p:extLst>
+      <p:ext uri="{BB962C8B-B14F-4D97-AF65-F5344CB8AC3E}">
+        <p14:creationId xmlns:p14="http://schemas.microsoft.com/office/powerpoint/2010/main" val="3401054901"/>
+      </p:ext>
+    </p:extLst>
+  </p:cSld>
+  <p:clrMapOvr>
+    <a:masterClrMapping/>
+  </p:clrMapOvr>
+</p:sld>
+</file>
+
+<file path=ppt/slides/slide13.xml><?xml version="1.0" encoding="utf-8"?>
 <p:sld xmlns:a="http://schemas.openxmlformats.org/drawingml/2006/main" xmlns:r="http://schemas.openxmlformats.org/officeDocument/2006/relationships" xmlns:p="http://schemas.openxmlformats.org/presentationml/2006/main">
   <p:cSld>
     <p:spTree>
@@ -6544,7 +7088,7 @@
 </p:sld>
 </file>
 
-<file path=ppt/slides/slide12.xml><?xml version="1.0" encoding="utf-8"?>
+<file path=ppt/slides/slide14.xml><?xml version="1.0" encoding="utf-8"?>
 <p:sld xmlns:a="http://schemas.openxmlformats.org/drawingml/2006/main" xmlns:r="http://schemas.openxmlformats.org/officeDocument/2006/relationships" xmlns:p="http://schemas.openxmlformats.org/presentationml/2006/main">
   <p:cSld>
     <p:spTree>
@@ -6652,7 +7196,7 @@
 </p:sld>
 </file>
 
-<file path=ppt/slides/slide13.xml><?xml version="1.0" encoding="utf-8"?>
+<file path=ppt/slides/slide15.xml><?xml version="1.0" encoding="utf-8"?>
 <p:sld xmlns:a="http://schemas.openxmlformats.org/drawingml/2006/main" xmlns:r="http://schemas.openxmlformats.org/officeDocument/2006/relationships" xmlns:p="http://schemas.openxmlformats.org/presentationml/2006/main">
   <p:cSld>
     <p:spTree>

</xml_diff>